<commit_message>
Various tweaks plus added disclaimer, terms and cookies links
</commit_message>
<xml_diff>
--- a/template-heymp.pptx
+++ b/template-heymp.pptx
@@ -3414,10 +3414,10 @@
       </p:grpSpPr>
       <p:pic>
         <p:nvPicPr>
-          <p:cNvPr id="5" name="Picture 4" descr="A person wearing a suit and tie&#10;&#10;Description automatically generated">
+          <p:cNvPr id="3" name="Graphic 2">
             <a:extLst>
               <a:ext uri="{FF2B5EF4-FFF2-40B4-BE49-F238E27FC236}">
-                <a16:creationId xmlns:a16="http://schemas.microsoft.com/office/drawing/2014/main" id="{C6B777AE-E95E-A547-9072-30606971D537}"/>
+                <a16:creationId xmlns:a16="http://schemas.microsoft.com/office/drawing/2014/main" id="{978E8E69-6965-AB42-B1E9-D8F54BA661EC}"/>
               </a:ext>
             </a:extLst>
           </p:cNvPr>
@@ -3427,15 +3427,59 @@
           <p:nvPr/>
         </p:nvPicPr>
         <p:blipFill>
-          <a:blip r:embed="rId3"/>
+          <a:blip r:embed="rId3">
+            <a:extLst>
+              <a:ext uri="{96DAC541-7B7A-43D3-8B79-37D633B846F1}">
+                <asvg:svgBlip xmlns:asvg="http://schemas.microsoft.com/office/drawing/2016/SVG/main" r:embed="rId4"/>
+              </a:ext>
+            </a:extLst>
+          </a:blip>
           <a:stretch>
             <a:fillRect/>
           </a:stretch>
         </p:blipFill>
         <p:spPr>
           <a:xfrm>
-            <a:off x="-809914" y="466164"/>
-            <a:ext cx="4567139" cy="6391835"/>
+            <a:off x="8028635" y="6123301"/>
+            <a:ext cx="1690144" cy="570423"/>
+          </a:xfrm>
+          <a:prstGeom prst="rect">
+            <a:avLst/>
+          </a:prstGeom>
+        </p:spPr>
+      </p:pic>
+      <p:pic>
+        <p:nvPicPr>
+          <p:cNvPr id="4" name="Picture 3" descr="A person wearing a suit and tie&#10;&#10;Description automatically generated">
+            <a:extLst>
+              <a:ext uri="{FF2B5EF4-FFF2-40B4-BE49-F238E27FC236}">
+                <a16:creationId xmlns:a16="http://schemas.microsoft.com/office/drawing/2014/main" id="{EE6CE43E-9DA5-0B44-91F7-34EB97F4F20A}"/>
+              </a:ext>
+            </a:extLst>
+          </p:cNvPr>
+          <p:cNvPicPr>
+            <a:picLocks noChangeAspect="1"/>
+          </p:cNvPicPr>
+          <p:nvPr/>
+        </p:nvPicPr>
+        <p:blipFill>
+          <a:blip r:embed="rId5">
+            <a:duotone>
+              <a:schemeClr val="accent3">
+                <a:shade val="45000"/>
+                <a:satMod val="135000"/>
+              </a:schemeClr>
+              <a:prstClr val="white"/>
+            </a:duotone>
+          </a:blip>
+          <a:stretch>
+            <a:fillRect/>
+          </a:stretch>
+        </p:blipFill>
+        <p:spPr>
+          <a:xfrm rot="167778">
+            <a:off x="-439766" y="1187033"/>
+            <a:ext cx="3699414" cy="5869542"/>
           </a:xfrm>
           <a:prstGeom prst="rect">
             <a:avLst/>
@@ -3532,193 +3576,8 @@
               <a:rPr lang="en-US" sz="8200" dirty="0">
                 <a:latin typeface="Staatliches" pitchFamily="2" charset="0"/>
               </a:rPr>
-              <a:t>HEY JACK</a:t>
-            </a:r>
-          </a:p>
-        </p:txBody>
-      </p:sp>
-      <p:pic>
-        <p:nvPicPr>
-          <p:cNvPr id="8" name="Google Shape;57;p13">
-            <a:extLst>
-              <a:ext uri="{FF2B5EF4-FFF2-40B4-BE49-F238E27FC236}">
-                <a16:creationId xmlns:a16="http://schemas.microsoft.com/office/drawing/2014/main" id="{D7ADE6C2-7EBF-8B4C-9B06-6A1BEF272A33}"/>
-              </a:ext>
-            </a:extLst>
-          </p:cNvPr>
-          <p:cNvPicPr preferRelativeResize="0"/>
-          <p:nvPr/>
-        </p:nvPicPr>
-        <p:blipFill rotWithShape="1">
-          <a:blip r:embed="rId4">
-            <a:alphaModFix/>
-            <a:biLevel thresh="25000"/>
-          </a:blip>
-          <a:srcRect l="10354" t="27927" r="9932" b="26786"/>
-          <a:stretch/>
-        </p:blipFill>
-        <p:spPr>
-          <a:xfrm>
-            <a:off x="7919456" y="6031216"/>
-            <a:ext cx="1967619" cy="790472"/>
-          </a:xfrm>
-          <a:prstGeom prst="rect">
-            <a:avLst/>
-          </a:prstGeom>
-          <a:noFill/>
-          <a:ln>
-            <a:noFill/>
-          </a:ln>
-        </p:spPr>
-      </p:pic>
-      <p:sp>
-        <p:nvSpPr>
-          <p:cNvPr id="9" name="Google Shape;56;p13">
-            <a:extLst>
-              <a:ext uri="{FF2B5EF4-FFF2-40B4-BE49-F238E27FC236}">
-                <a16:creationId xmlns:a16="http://schemas.microsoft.com/office/drawing/2014/main" id="{241B7E24-8F35-6C4D-98CF-C81143303185}"/>
-              </a:ext>
-            </a:extLst>
-          </p:cNvPr>
-          <p:cNvSpPr txBox="1"/>
-          <p:nvPr/>
-        </p:nvSpPr>
-        <p:spPr>
-          <a:xfrm>
-            <a:off x="2442483" y="6426452"/>
-            <a:ext cx="7463517" cy="439125"/>
-          </a:xfrm>
-          <a:prstGeom prst="rect">
-            <a:avLst/>
-          </a:prstGeom>
-          <a:noFill/>
-          <a:ln>
-            <a:noFill/>
-          </a:ln>
-        </p:spPr>
-        <p:txBody>
-          <a:bodyPr spcFirstLastPara="1" wrap="square" lIns="91425" tIns="91425" rIns="91425" bIns="91425" anchor="t" anchorCtr="0">
-            <a:noAutofit/>
-          </a:bodyPr>
-          <a:lstStyle/>
-          <a:p>
-            <a:pPr lvl="0"/>
-            <a:r>
-              <a:rPr lang="en" sz="500" dirty="0">
-                <a:solidFill>
-                  <a:srgbClr val="999999"/>
-                </a:solidFill>
-                <a:latin typeface="Arial" panose="020B0604020202020204" pitchFamily="34" charset="0"/>
-                <a:cs typeface="Arial" panose="020B0604020202020204" pitchFamily="34" charset="0"/>
-              </a:rPr>
-              <a:t>MP portrait image is used under Creative Commons </a:t>
-            </a:r>
-            <a:r>
-              <a:rPr lang="en-GB" sz="500" dirty="0">
-                <a:solidFill>
-                  <a:srgbClr val="999999"/>
-                </a:solidFill>
-                <a:latin typeface="Arial" panose="020B0604020202020204" pitchFamily="34" charset="0"/>
-                <a:cs typeface="Arial" panose="020B0604020202020204" pitchFamily="34" charset="0"/>
-              </a:rPr>
-              <a:t>Attribution 3.0 </a:t>
-            </a:r>
-            <a:r>
-              <a:rPr lang="en-GB" sz="500" dirty="0" err="1">
-                <a:solidFill>
-                  <a:srgbClr val="999999"/>
-                </a:solidFill>
-                <a:latin typeface="Arial" panose="020B0604020202020204" pitchFamily="34" charset="0"/>
-                <a:cs typeface="Arial" panose="020B0604020202020204" pitchFamily="34" charset="0"/>
-              </a:rPr>
-              <a:t>Unported</a:t>
-            </a:r>
-            <a:r>
-              <a:rPr lang="en-GB" sz="500" dirty="0">
-                <a:solidFill>
-                  <a:srgbClr val="999999"/>
-                </a:solidFill>
-                <a:latin typeface="Arial" panose="020B0604020202020204" pitchFamily="34" charset="0"/>
-                <a:cs typeface="Arial" panose="020B0604020202020204" pitchFamily="34" charset="0"/>
-              </a:rPr>
-              <a:t> (CC BY 3.0) license, taken </a:t>
-            </a:r>
-            <a:r>
-              <a:rPr lang="en" sz="500" dirty="0">
-                <a:solidFill>
-                  <a:srgbClr val="999999"/>
-                </a:solidFill>
-                <a:latin typeface="Arial" panose="020B0604020202020204" pitchFamily="34" charset="0"/>
-                <a:cs typeface="Arial" panose="020B0604020202020204" pitchFamily="34" charset="0"/>
-              </a:rPr>
-              <a:t>from </a:t>
-            </a:r>
-            <a:r>
-              <a:rPr lang="en" sz="500" dirty="0" err="1">
-                <a:solidFill>
-                  <a:srgbClr val="999999"/>
-                </a:solidFill>
-                <a:latin typeface="Arial" panose="020B0604020202020204" pitchFamily="34" charset="0"/>
-                <a:cs typeface="Arial" panose="020B0604020202020204" pitchFamily="34" charset="0"/>
-              </a:rPr>
-              <a:t>beta.parliament.gov.uk</a:t>
-            </a:r>
-            <a:r>
-              <a:rPr lang="en" sz="500" dirty="0">
-                <a:solidFill>
-                  <a:srgbClr val="999999"/>
-                </a:solidFill>
-                <a:latin typeface="Arial" panose="020B0604020202020204" pitchFamily="34" charset="0"/>
-                <a:cs typeface="Arial" panose="020B0604020202020204" pitchFamily="34" charset="0"/>
-              </a:rPr>
-              <a:t> with original image background removed by algorithm.</a:t>
-            </a:r>
-            <a:br>
-              <a:rPr lang="en" sz="500" dirty="0">
-                <a:solidFill>
-                  <a:srgbClr val="999999"/>
-                </a:solidFill>
-                <a:latin typeface="Arial" panose="020B0604020202020204" pitchFamily="34" charset="0"/>
-                <a:cs typeface="Arial" panose="020B0604020202020204" pitchFamily="34" charset="0"/>
-              </a:rPr>
-            </a:br>
-            <a:r>
-              <a:rPr lang="en" sz="500" dirty="0">
-                <a:solidFill>
-                  <a:srgbClr val="999999"/>
-                </a:solidFill>
-                <a:latin typeface="Arial" panose="020B0604020202020204" pitchFamily="34" charset="0"/>
-                <a:cs typeface="Arial" panose="020B0604020202020204" pitchFamily="34" charset="0"/>
-              </a:rPr>
-              <a:t>Promoted by Eloise Todd on behalf of Best for Britain, the campaign name of UK-EU OPEN POLICY LIMITED registered at International House, 24 </a:t>
-            </a:r>
-            <a:r>
-              <a:rPr lang="en" sz="500" dirty="0" err="1">
-                <a:solidFill>
-                  <a:srgbClr val="999999"/>
-                </a:solidFill>
-                <a:latin typeface="Arial" panose="020B0604020202020204" pitchFamily="34" charset="0"/>
-                <a:cs typeface="Arial" panose="020B0604020202020204" pitchFamily="34" charset="0"/>
-              </a:rPr>
-              <a:t>Holborn</a:t>
-            </a:r>
-            <a:r>
-              <a:rPr lang="en" sz="500" dirty="0">
-                <a:solidFill>
-                  <a:srgbClr val="999999"/>
-                </a:solidFill>
-                <a:latin typeface="Arial" panose="020B0604020202020204" pitchFamily="34" charset="0"/>
-                <a:cs typeface="Arial" panose="020B0604020202020204" pitchFamily="34" charset="0"/>
-              </a:rPr>
-              <a:t> Viaduct, London, EC1A 2BN.</a:t>
-            </a:r>
-            <a:endParaRPr sz="500" dirty="0">
-              <a:solidFill>
-                <a:srgbClr val="999999"/>
-              </a:solidFill>
-              <a:latin typeface="Arial" panose="020B0604020202020204" pitchFamily="34" charset="0"/>
-              <a:cs typeface="Arial" panose="020B0604020202020204" pitchFamily="34" charset="0"/>
-            </a:endParaRPr>
+              <a:t>HEY MY MP</a:t>
+            </a:r>
           </a:p>
         </p:txBody>
       </p:sp>
@@ -3735,9 +3594,9 @@
           <p:nvPr/>
         </p:nvSpPr>
         <p:spPr>
-          <a:xfrm rot="21193737">
-            <a:off x="1678360" y="159437"/>
-            <a:ext cx="3175934" cy="614399"/>
+          <a:xfrm rot="21300000">
+            <a:off x="1726332" y="236031"/>
+            <a:ext cx="3190297" cy="682495"/>
           </a:xfrm>
           <a:prstGeom prst="rect">
             <a:avLst/>
@@ -3756,7 +3615,7 @@
               </a:lnSpc>
             </a:pPr>
             <a:r>
-              <a:rPr lang="en-US" sz="2300" dirty="0">
+              <a:rPr lang="en-US" sz="2600" dirty="0">
                 <a:solidFill>
                   <a:schemeClr val="tx1">
                     <a:lumMod val="50000"/>
@@ -3765,10 +3624,10 @@
                 </a:solidFill>
                 <a:latin typeface="FG Cheryl" panose="02000506030000020004" pitchFamily="2" charset="0"/>
               </a:rPr>
-              <a:t>Jack Brereton</a:t>
+              <a:t>Your MP’s Name &amp; Photo</a:t>
             </a:r>
             <a:br>
-              <a:rPr lang="en-US" sz="2300" dirty="0">
+              <a:rPr lang="en-US" sz="2600" dirty="0">
                 <a:solidFill>
                   <a:schemeClr val="tx1">
                     <a:lumMod val="50000"/>
@@ -3779,7 +3638,7 @@
               </a:rPr>
             </a:br>
             <a:r>
-              <a:rPr lang="en-US" sz="2300" dirty="0">
+              <a:rPr lang="en-US" sz="2600" dirty="0">
                 <a:solidFill>
                   <a:schemeClr val="tx1">
                     <a:lumMod val="50000"/>
@@ -3788,7 +3647,7 @@
                 </a:solidFill>
                 <a:latin typeface="FG Cheryl" panose="02000506030000020004" pitchFamily="2" charset="0"/>
               </a:rPr>
-              <a:t>MP for Stoke on Trent South</a:t>
+              <a:t>MP for Your Constituency</a:t>
             </a:r>
           </a:p>
         </p:txBody>
@@ -3807,7 +3666,7 @@
         </p:nvSpPr>
         <p:spPr>
           <a:xfrm>
-            <a:off x="1409249" y="636431"/>
+            <a:off x="1409249" y="712631"/>
             <a:ext cx="274320" cy="295898"/>
           </a:xfrm>
           <a:custGeom>
@@ -4051,6 +3910,157 @@
           <a:p>
             <a:pPr algn="ctr"/>
             <a:endParaRPr lang="en-US"/>
+          </a:p>
+        </p:txBody>
+      </p:sp>
+      <p:sp>
+        <p:nvSpPr>
+          <p:cNvPr id="9" name="Google Shape;56;p13">
+            <a:extLst>
+              <a:ext uri="{FF2B5EF4-FFF2-40B4-BE49-F238E27FC236}">
+                <a16:creationId xmlns:a16="http://schemas.microsoft.com/office/drawing/2014/main" id="{FBABCC46-AAAF-2F49-928C-3FCEBBF5B918}"/>
+              </a:ext>
+            </a:extLst>
+          </p:cNvPr>
+          <p:cNvSpPr txBox="1"/>
+          <p:nvPr/>
+        </p:nvSpPr>
+        <p:spPr>
+          <a:xfrm>
+            <a:off x="3245161" y="6356117"/>
+            <a:ext cx="4374839" cy="375684"/>
+          </a:xfrm>
+          <a:prstGeom prst="rect">
+            <a:avLst/>
+          </a:prstGeom>
+          <a:noFill/>
+          <a:ln>
+            <a:noFill/>
+          </a:ln>
+        </p:spPr>
+        <p:txBody>
+          <a:bodyPr spcFirstLastPara="1" wrap="square" lIns="91425" tIns="91425" rIns="91425" bIns="91425" anchor="t" anchorCtr="0">
+            <a:noAutofit/>
+          </a:bodyPr>
+          <a:lstStyle/>
+          <a:p>
+            <a:pPr lvl="0"/>
+            <a:r>
+              <a:rPr lang="en" sz="550" dirty="0">
+                <a:solidFill>
+                  <a:srgbClr val="999999"/>
+                </a:solidFill>
+                <a:latin typeface="Arial" panose="020B0604020202020204" pitchFamily="34" charset="0"/>
+                <a:cs typeface="Arial" panose="020B0604020202020204" pitchFamily="34" charset="0"/>
+              </a:rPr>
+              <a:t>MP portrait image is used under Creative Commons </a:t>
+            </a:r>
+            <a:r>
+              <a:rPr lang="en-GB" sz="550" dirty="0">
+                <a:solidFill>
+                  <a:srgbClr val="999999"/>
+                </a:solidFill>
+                <a:latin typeface="Arial" panose="020B0604020202020204" pitchFamily="34" charset="0"/>
+                <a:cs typeface="Arial" panose="020B0604020202020204" pitchFamily="34" charset="0"/>
+              </a:rPr>
+              <a:t>Attribution 3.0 </a:t>
+            </a:r>
+            <a:r>
+              <a:rPr lang="en-GB" sz="550" dirty="0" err="1">
+                <a:solidFill>
+                  <a:srgbClr val="999999"/>
+                </a:solidFill>
+                <a:latin typeface="Arial" panose="020B0604020202020204" pitchFamily="34" charset="0"/>
+                <a:cs typeface="Arial" panose="020B0604020202020204" pitchFamily="34" charset="0"/>
+              </a:rPr>
+              <a:t>Unported</a:t>
+            </a:r>
+            <a:r>
+              <a:rPr lang="en-GB" sz="550" dirty="0">
+                <a:solidFill>
+                  <a:srgbClr val="999999"/>
+                </a:solidFill>
+                <a:latin typeface="Arial" panose="020B0604020202020204" pitchFamily="34" charset="0"/>
+                <a:cs typeface="Arial" panose="020B0604020202020204" pitchFamily="34" charset="0"/>
+              </a:rPr>
+              <a:t> (CC BY 3.0) license, retrieved </a:t>
+            </a:r>
+            <a:r>
+              <a:rPr lang="en" sz="550" dirty="0">
+                <a:solidFill>
+                  <a:srgbClr val="999999"/>
+                </a:solidFill>
+                <a:latin typeface="Arial" panose="020B0604020202020204" pitchFamily="34" charset="0"/>
+                <a:cs typeface="Arial" panose="020B0604020202020204" pitchFamily="34" charset="0"/>
+              </a:rPr>
+              <a:t>from </a:t>
+            </a:r>
+            <a:r>
+              <a:rPr lang="en" sz="550" dirty="0" err="1">
+                <a:solidFill>
+                  <a:srgbClr val="999999"/>
+                </a:solidFill>
+                <a:latin typeface="Arial" panose="020B0604020202020204" pitchFamily="34" charset="0"/>
+                <a:cs typeface="Arial" panose="020B0604020202020204" pitchFamily="34" charset="0"/>
+              </a:rPr>
+              <a:t>beta.parliament.gov.uk</a:t>
+            </a:r>
+            <a:r>
+              <a:rPr lang="en" sz="550" dirty="0">
+                <a:solidFill>
+                  <a:srgbClr val="999999"/>
+                </a:solidFill>
+                <a:latin typeface="Arial" panose="020B0604020202020204" pitchFamily="34" charset="0"/>
+                <a:cs typeface="Arial" panose="020B0604020202020204" pitchFamily="34" charset="0"/>
+              </a:rPr>
+              <a:t> and modified by removal of image background. Promoted by Eloise Todd on behalf of Best for Britain, the campaign name of</a:t>
+            </a:r>
+            <a:br>
+              <a:rPr lang="en" sz="550" dirty="0">
+                <a:solidFill>
+                  <a:srgbClr val="999999"/>
+                </a:solidFill>
+                <a:latin typeface="Arial" panose="020B0604020202020204" pitchFamily="34" charset="0"/>
+                <a:cs typeface="Arial" panose="020B0604020202020204" pitchFamily="34" charset="0"/>
+              </a:rPr>
+            </a:br>
+            <a:r>
+              <a:rPr lang="en" sz="550" dirty="0">
+                <a:solidFill>
+                  <a:srgbClr val="999999"/>
+                </a:solidFill>
+                <a:latin typeface="Arial" panose="020B0604020202020204" pitchFamily="34" charset="0"/>
+                <a:cs typeface="Arial" panose="020B0604020202020204" pitchFamily="34" charset="0"/>
+              </a:rPr>
+              <a:t>UK-EU OPEN POLICY LIMITED registered at International House, 24 </a:t>
+            </a:r>
+            <a:r>
+              <a:rPr lang="en" sz="550" dirty="0" err="1">
+                <a:solidFill>
+                  <a:srgbClr val="999999"/>
+                </a:solidFill>
+                <a:latin typeface="Arial" panose="020B0604020202020204" pitchFamily="34" charset="0"/>
+                <a:cs typeface="Arial" panose="020B0604020202020204" pitchFamily="34" charset="0"/>
+              </a:rPr>
+              <a:t>Holborn</a:t>
+            </a:r>
+            <a:r>
+              <a:rPr lang="en" sz="550" dirty="0">
+                <a:solidFill>
+                  <a:srgbClr val="999999"/>
+                </a:solidFill>
+                <a:latin typeface="Arial" panose="020B0604020202020204" pitchFamily="34" charset="0"/>
+                <a:cs typeface="Arial" panose="020B0604020202020204" pitchFamily="34" charset="0"/>
+              </a:rPr>
+              <a:t> Viaduct, London, EC1A 2BN.</a:t>
+            </a:r>
+            <a:endParaRPr sz="550" dirty="0">
+              <a:solidFill>
+                <a:srgbClr val="999999"/>
+              </a:solidFill>
+              <a:latin typeface="Arial" panose="020B0604020202020204" pitchFamily="34" charset="0"/>
+              <a:cs typeface="Arial" panose="020B0604020202020204" pitchFamily="34" charset="0"/>
+            </a:endParaRPr>
           </a:p>
         </p:txBody>
       </p:sp>

</xml_diff>

<commit_message>
Corrected beta.parliament.uk URLs throughout
</commit_message>
<xml_diff>
--- a/template-heymp.pptx
+++ b/template-heymp.pptx
@@ -3928,7 +3928,7 @@
         <p:spPr>
           <a:xfrm>
             <a:off x="3245161" y="6356117"/>
-            <a:ext cx="4374839" cy="375684"/>
+            <a:ext cx="4326517" cy="375684"/>
           </a:xfrm>
           <a:prstGeom prst="rect">
             <a:avLst/>
@@ -4003,7 +4003,7 @@
                 <a:latin typeface="Arial" panose="020B0604020202020204" pitchFamily="34" charset="0"/>
                 <a:cs typeface="Arial" panose="020B0604020202020204" pitchFamily="34" charset="0"/>
               </a:rPr>
-              <a:t>beta.parliament.gov.uk</a:t>
+              <a:t>beta.parliament.uk</a:t>
             </a:r>
             <a:r>
               <a:rPr lang="en" sz="550" dirty="0">

</xml_diff>